<commit_message>
tweaked slides for prototypal stuff
</commit_message>
<xml_diff>
--- a/javascript/prototypes/Prototypal Inheritance.pptx
+++ b/javascript/prototypes/Prototypal Inheritance.pptx
@@ -4106,6 +4106,13 @@
         </dgm:presLayoutVars>
       </dgm:prSet>
       <dgm:spPr/>
+      <dgm:t>
+        <a:bodyPr/>
+        <a:lstStyle/>
+        <a:p>
+          <a:endParaRPr lang="en-US"/>
+        </a:p>
+      </dgm:t>
     </dgm:pt>
     <dgm:pt modelId="{14A88C18-AA4E-BD4D-B803-53276C2256FF}" type="pres">
       <dgm:prSet presAssocID="{9642E894-8B60-944D-B4F6-E9F5F2594064}" presName="node" presStyleLbl="node1" presStyleIdx="0" presStyleCnt="2">
@@ -4114,14 +4121,35 @@
         </dgm:presLayoutVars>
       </dgm:prSet>
       <dgm:spPr/>
+      <dgm:t>
+        <a:bodyPr/>
+        <a:lstStyle/>
+        <a:p>
+          <a:endParaRPr lang="en-US"/>
+        </a:p>
+      </dgm:t>
     </dgm:pt>
     <dgm:pt modelId="{6284B464-1A7B-D444-A2BE-E2E521ACCCB8}" type="pres">
       <dgm:prSet presAssocID="{E28A434D-72B9-D649-8DB9-55AC5841DF42}" presName="sibTrans" presStyleLbl="sibTrans2D1" presStyleIdx="0" presStyleCnt="1"/>
       <dgm:spPr/>
+      <dgm:t>
+        <a:bodyPr/>
+        <a:lstStyle/>
+        <a:p>
+          <a:endParaRPr lang="en-US"/>
+        </a:p>
+      </dgm:t>
     </dgm:pt>
     <dgm:pt modelId="{BF28F2E6-7193-234F-8FB1-AAF2A3EBE557}" type="pres">
       <dgm:prSet presAssocID="{E28A434D-72B9-D649-8DB9-55AC5841DF42}" presName="connectorText" presStyleLbl="sibTrans2D1" presStyleIdx="0" presStyleCnt="1"/>
       <dgm:spPr/>
+      <dgm:t>
+        <a:bodyPr/>
+        <a:lstStyle/>
+        <a:p>
+          <a:endParaRPr lang="en-US"/>
+        </a:p>
+      </dgm:t>
     </dgm:pt>
     <dgm:pt modelId="{3A6ED4CC-B098-9147-8E3B-3F526EDD15F7}" type="pres">
       <dgm:prSet presAssocID="{B04196DF-31B7-B140-9353-90A506618B31}" presName="node" presStyleLbl="node1" presStyleIdx="1" presStyleCnt="2">
@@ -4140,21 +4168,21 @@
     </dgm:pt>
   </dgm:ptLst>
   <dgm:cxnLst>
-    <dgm:cxn modelId="{535A3852-31DF-4649-B55B-E46B2392CB7F}" srcId="{8C985AD4-9E86-B04D-BBB7-D3B639B645CB}" destId="{9642E894-8B60-944D-B4F6-E9F5F2594064}" srcOrd="0" destOrd="0" parTransId="{C8344657-9824-7A43-BD2B-E4D093FDF8A8}" sibTransId="{E28A434D-72B9-D649-8DB9-55AC5841DF42}"/>
+    <dgm:cxn modelId="{41C68475-13AA-434E-BAD1-631928088EC9}" type="presOf" srcId="{02AF8EE1-14D4-CA4B-8D3E-382ACBEF7295}" destId="{3A6ED4CC-B098-9147-8E3B-3F526EDD15F7}" srcOrd="0" destOrd="1" presId="urn:microsoft.com/office/officeart/2005/8/layout/process1"/>
+    <dgm:cxn modelId="{C2E7BA9C-C01E-EE40-A918-350CC5C92C6D}" type="presOf" srcId="{9642E894-8B60-944D-B4F6-E9F5F2594064}" destId="{14A88C18-AA4E-BD4D-B803-53276C2256FF}" srcOrd="0" destOrd="0" presId="urn:microsoft.com/office/officeart/2005/8/layout/process1"/>
+    <dgm:cxn modelId="{9718AB79-700E-4C40-B762-FEB6843BDD15}" type="presOf" srcId="{E28A434D-72B9-D649-8DB9-55AC5841DF42}" destId="{6284B464-1A7B-D444-A2BE-E2E521ACCCB8}" srcOrd="0" destOrd="0" presId="urn:microsoft.com/office/officeart/2005/8/layout/process1"/>
+    <dgm:cxn modelId="{2D819F4B-FF48-9546-BC80-4D3842DA58D9}" type="presOf" srcId="{0F31D03D-E524-6543-A996-A9D25B597C25}" destId="{14A88C18-AA4E-BD4D-B803-53276C2256FF}" srcOrd="0" destOrd="2" presId="urn:microsoft.com/office/officeart/2005/8/layout/process1"/>
+    <dgm:cxn modelId="{D7C5D51A-10C0-0E4D-A371-BF8B939A67A8}" srcId="{9642E894-8B60-944D-B4F6-E9F5F2594064}" destId="{0F31D03D-E524-6543-A996-A9D25B597C25}" srcOrd="1" destOrd="0" parTransId="{F12FFA09-BC22-B14B-BB86-5BDB75C4A7FB}" sibTransId="{9525385A-D13C-4148-9CE2-B49B534D30C5}"/>
     <dgm:cxn modelId="{7303D779-A263-4243-9AB2-D64AB7C30750}" srcId="{9642E894-8B60-944D-B4F6-E9F5F2594064}" destId="{0EFD6272-B740-E84F-91F9-C45CC3AABC7C}" srcOrd="0" destOrd="0" parTransId="{1F17CC2C-DAC1-1F44-A742-85A529D0BA2B}" sibTransId="{16743C91-E4E4-A14B-A150-311EB7F3B15E}"/>
     <dgm:cxn modelId="{3912FCDF-45CE-F844-92E7-C6AB9459C0F7}" type="presOf" srcId="{8C985AD4-9E86-B04D-BBB7-D3B639B645CB}" destId="{F4C2CDDE-57E9-2146-968A-B1C7A1571F97}" srcOrd="0" destOrd="0" presId="urn:microsoft.com/office/officeart/2005/8/layout/process1"/>
+    <dgm:cxn modelId="{57C57F6D-C970-0B4D-AA87-BD117325B624}" type="presOf" srcId="{0EFD6272-B740-E84F-91F9-C45CC3AABC7C}" destId="{14A88C18-AA4E-BD4D-B803-53276C2256FF}" srcOrd="0" destOrd="1" presId="urn:microsoft.com/office/officeart/2005/8/layout/process1"/>
+    <dgm:cxn modelId="{535A3852-31DF-4649-B55B-E46B2392CB7F}" srcId="{8C985AD4-9E86-B04D-BBB7-D3B639B645CB}" destId="{9642E894-8B60-944D-B4F6-E9F5F2594064}" srcOrd="0" destOrd="0" parTransId="{C8344657-9824-7A43-BD2B-E4D093FDF8A8}" sibTransId="{E28A434D-72B9-D649-8DB9-55AC5841DF42}"/>
+    <dgm:cxn modelId="{CD8E0133-B607-8245-944C-FC4372E0096D}" type="presOf" srcId="{A39D171C-5043-DD4B-AA25-B6B444FA914D}" destId="{3A6ED4CC-B098-9147-8E3B-3F526EDD15F7}" srcOrd="0" destOrd="2" presId="urn:microsoft.com/office/officeart/2005/8/layout/process1"/>
     <dgm:cxn modelId="{073D2AE7-15A3-0C4F-906D-487AB6B9BDF6}" srcId="{8C985AD4-9E86-B04D-BBB7-D3B639B645CB}" destId="{B04196DF-31B7-B140-9353-90A506618B31}" srcOrd="1" destOrd="0" parTransId="{D532DB2E-089D-8A40-8712-BE36A653F3A2}" sibTransId="{74DFB14E-D571-BA4D-BFB4-3B96439B0008}"/>
-    <dgm:cxn modelId="{C2E7BA9C-C01E-EE40-A918-350CC5C92C6D}" type="presOf" srcId="{9642E894-8B60-944D-B4F6-E9F5F2594064}" destId="{14A88C18-AA4E-BD4D-B803-53276C2256FF}" srcOrd="0" destOrd="0" presId="urn:microsoft.com/office/officeart/2005/8/layout/process1"/>
-    <dgm:cxn modelId="{9E51536E-CD83-2E48-A10A-B888DF3EACB8}" srcId="{B04196DF-31B7-B140-9353-90A506618B31}" destId="{A39D171C-5043-DD4B-AA25-B6B444FA914D}" srcOrd="1" destOrd="0" parTransId="{6134CDEA-D87D-CC46-824F-D2DFFF8911E0}" sibTransId="{5C0ABBCD-CCD9-7741-9B3C-EBECEC3DEDE2}"/>
-    <dgm:cxn modelId="{D7C5D51A-10C0-0E4D-A371-BF8B939A67A8}" srcId="{9642E894-8B60-944D-B4F6-E9F5F2594064}" destId="{0F31D03D-E524-6543-A996-A9D25B597C25}" srcOrd="1" destOrd="0" parTransId="{F12FFA09-BC22-B14B-BB86-5BDB75C4A7FB}" sibTransId="{9525385A-D13C-4148-9CE2-B49B534D30C5}"/>
-    <dgm:cxn modelId="{CD8E0133-B607-8245-944C-FC4372E0096D}" type="presOf" srcId="{A39D171C-5043-DD4B-AA25-B6B444FA914D}" destId="{3A6ED4CC-B098-9147-8E3B-3F526EDD15F7}" srcOrd="0" destOrd="2" presId="urn:microsoft.com/office/officeart/2005/8/layout/process1"/>
-    <dgm:cxn modelId="{2D819F4B-FF48-9546-BC80-4D3842DA58D9}" type="presOf" srcId="{0F31D03D-E524-6543-A996-A9D25B597C25}" destId="{14A88C18-AA4E-BD4D-B803-53276C2256FF}" srcOrd="0" destOrd="2" presId="urn:microsoft.com/office/officeart/2005/8/layout/process1"/>
-    <dgm:cxn modelId="{DB58E763-FE24-7545-AE56-04B2C891ADCE}" type="presOf" srcId="{E28A434D-72B9-D649-8DB9-55AC5841DF42}" destId="{BF28F2E6-7193-234F-8FB1-AAF2A3EBE557}" srcOrd="1" destOrd="0" presId="urn:microsoft.com/office/officeart/2005/8/layout/process1"/>
-    <dgm:cxn modelId="{9718AB79-700E-4C40-B762-FEB6843BDD15}" type="presOf" srcId="{E28A434D-72B9-D649-8DB9-55AC5841DF42}" destId="{6284B464-1A7B-D444-A2BE-E2E521ACCCB8}" srcOrd="0" destOrd="0" presId="urn:microsoft.com/office/officeart/2005/8/layout/process1"/>
     <dgm:cxn modelId="{D058860E-4862-5F4D-92B1-1ECFE373AA59}" srcId="{B04196DF-31B7-B140-9353-90A506618B31}" destId="{02AF8EE1-14D4-CA4B-8D3E-382ACBEF7295}" srcOrd="0" destOrd="0" parTransId="{ECB2AC98-5482-F648-9C26-0652782AE752}" sibTransId="{91F032E0-825E-EA41-9FE6-DA5D03E65C96}"/>
     <dgm:cxn modelId="{255B50BD-17B5-FB4D-AF6E-D67C8709FB2D}" type="presOf" srcId="{B04196DF-31B7-B140-9353-90A506618B31}" destId="{3A6ED4CC-B098-9147-8E3B-3F526EDD15F7}" srcOrd="0" destOrd="0" presId="urn:microsoft.com/office/officeart/2005/8/layout/process1"/>
-    <dgm:cxn modelId="{57C57F6D-C970-0B4D-AA87-BD117325B624}" type="presOf" srcId="{0EFD6272-B740-E84F-91F9-C45CC3AABC7C}" destId="{14A88C18-AA4E-BD4D-B803-53276C2256FF}" srcOrd="0" destOrd="1" presId="urn:microsoft.com/office/officeart/2005/8/layout/process1"/>
-    <dgm:cxn modelId="{41C68475-13AA-434E-BAD1-631928088EC9}" type="presOf" srcId="{02AF8EE1-14D4-CA4B-8D3E-382ACBEF7295}" destId="{3A6ED4CC-B098-9147-8E3B-3F526EDD15F7}" srcOrd="0" destOrd="1" presId="urn:microsoft.com/office/officeart/2005/8/layout/process1"/>
+    <dgm:cxn modelId="{9E51536E-CD83-2E48-A10A-B888DF3EACB8}" srcId="{B04196DF-31B7-B140-9353-90A506618B31}" destId="{A39D171C-5043-DD4B-AA25-B6B444FA914D}" srcOrd="1" destOrd="0" parTransId="{6134CDEA-D87D-CC46-824F-D2DFFF8911E0}" sibTransId="{5C0ABBCD-CCD9-7741-9B3C-EBECEC3DEDE2}"/>
+    <dgm:cxn modelId="{DB58E763-FE24-7545-AE56-04B2C891ADCE}" type="presOf" srcId="{E28A434D-72B9-D649-8DB9-55AC5841DF42}" destId="{BF28F2E6-7193-234F-8FB1-AAF2A3EBE557}" srcOrd="1" destOrd="0" presId="urn:microsoft.com/office/officeart/2005/8/layout/process1"/>
     <dgm:cxn modelId="{20AD8AD8-D4AC-4A4B-AAE4-F5DF777049E8}" type="presParOf" srcId="{F4C2CDDE-57E9-2146-968A-B1C7A1571F97}" destId="{14A88C18-AA4E-BD4D-B803-53276C2256FF}" srcOrd="0" destOrd="0" presId="urn:microsoft.com/office/officeart/2005/8/layout/process1"/>
     <dgm:cxn modelId="{0C3F5AB1-CFD8-2647-82EA-063335A69784}" type="presParOf" srcId="{F4C2CDDE-57E9-2146-968A-B1C7A1571F97}" destId="{6284B464-1A7B-D444-A2BE-E2E521ACCCB8}" srcOrd="1" destOrd="0" presId="urn:microsoft.com/office/officeart/2005/8/layout/process1"/>
     <dgm:cxn modelId="{BF63D6EF-0F26-A843-B6B9-9C56D10FDDCD}" type="presParOf" srcId="{6284B464-1A7B-D444-A2BE-E2E521ACCCB8}" destId="{BF28F2E6-7193-234F-8FB1-AAF2A3EBE557}" srcOrd="0" destOrd="0" presId="urn:microsoft.com/office/officeart/2005/8/layout/process1"/>
@@ -4611,6 +4639,13 @@
         </dgm:presLayoutVars>
       </dgm:prSet>
       <dgm:spPr/>
+      <dgm:t>
+        <a:bodyPr/>
+        <a:lstStyle/>
+        <a:p>
+          <a:endParaRPr lang="en-US"/>
+        </a:p>
+      </dgm:t>
     </dgm:pt>
     <dgm:pt modelId="{14A88C18-AA4E-BD4D-B803-53276C2256FF}" type="pres">
       <dgm:prSet presAssocID="{9642E894-8B60-944D-B4F6-E9F5F2594064}" presName="node" presStyleLbl="node1" presStyleIdx="0" presStyleCnt="4">
@@ -4619,14 +4654,35 @@
         </dgm:presLayoutVars>
       </dgm:prSet>
       <dgm:spPr/>
+      <dgm:t>
+        <a:bodyPr/>
+        <a:lstStyle/>
+        <a:p>
+          <a:endParaRPr lang="en-US"/>
+        </a:p>
+      </dgm:t>
     </dgm:pt>
     <dgm:pt modelId="{6284B464-1A7B-D444-A2BE-E2E521ACCCB8}" type="pres">
       <dgm:prSet presAssocID="{E28A434D-72B9-D649-8DB9-55AC5841DF42}" presName="sibTrans" presStyleLbl="sibTrans2D1" presStyleIdx="0" presStyleCnt="3"/>
       <dgm:spPr/>
+      <dgm:t>
+        <a:bodyPr/>
+        <a:lstStyle/>
+        <a:p>
+          <a:endParaRPr lang="en-US"/>
+        </a:p>
+      </dgm:t>
     </dgm:pt>
     <dgm:pt modelId="{BF28F2E6-7193-234F-8FB1-AAF2A3EBE557}" type="pres">
       <dgm:prSet presAssocID="{E28A434D-72B9-D649-8DB9-55AC5841DF42}" presName="connectorText" presStyleLbl="sibTrans2D1" presStyleIdx="0" presStyleCnt="3"/>
       <dgm:spPr/>
+      <dgm:t>
+        <a:bodyPr/>
+        <a:lstStyle/>
+        <a:p>
+          <a:endParaRPr lang="en-US"/>
+        </a:p>
+      </dgm:t>
     </dgm:pt>
     <dgm:pt modelId="{3A6ED4CC-B098-9147-8E3B-3F526EDD15F7}" type="pres">
       <dgm:prSet presAssocID="{B04196DF-31B7-B140-9353-90A506618B31}" presName="node" presStyleLbl="node1" presStyleIdx="1" presStyleCnt="4">
@@ -4646,10 +4702,24 @@
     <dgm:pt modelId="{340920B6-0814-CC4A-A269-3E1426A6FAB4}" type="pres">
       <dgm:prSet presAssocID="{74DFB14E-D571-BA4D-BFB4-3B96439B0008}" presName="sibTrans" presStyleLbl="sibTrans2D1" presStyleIdx="1" presStyleCnt="3"/>
       <dgm:spPr/>
+      <dgm:t>
+        <a:bodyPr/>
+        <a:lstStyle/>
+        <a:p>
+          <a:endParaRPr lang="en-US"/>
+        </a:p>
+      </dgm:t>
     </dgm:pt>
     <dgm:pt modelId="{A304CD21-B01F-6641-AAB1-ADA2649AEB18}" type="pres">
       <dgm:prSet presAssocID="{74DFB14E-D571-BA4D-BFB4-3B96439B0008}" presName="connectorText" presStyleLbl="sibTrans2D1" presStyleIdx="1" presStyleCnt="3"/>
       <dgm:spPr/>
+      <dgm:t>
+        <a:bodyPr/>
+        <a:lstStyle/>
+        <a:p>
+          <a:endParaRPr lang="en-US"/>
+        </a:p>
+      </dgm:t>
     </dgm:pt>
     <dgm:pt modelId="{990474B0-CFFA-3940-A167-1C826577395D}" type="pres">
       <dgm:prSet presAssocID="{0396D1A3-D4F7-8C47-AED2-BFEDE4DB086A}" presName="node" presStyleLbl="node1" presStyleIdx="2" presStyleCnt="4">
@@ -4669,10 +4739,24 @@
     <dgm:pt modelId="{488AEF68-A75B-DC48-8393-94944E4642FF}" type="pres">
       <dgm:prSet presAssocID="{F33A5086-A1FF-184B-9C93-DFF547067F95}" presName="sibTrans" presStyleLbl="sibTrans2D1" presStyleIdx="2" presStyleCnt="3"/>
       <dgm:spPr/>
+      <dgm:t>
+        <a:bodyPr/>
+        <a:lstStyle/>
+        <a:p>
+          <a:endParaRPr lang="en-US"/>
+        </a:p>
+      </dgm:t>
     </dgm:pt>
     <dgm:pt modelId="{F7ECEAE8-7A8E-A34C-9E9D-75EAFB0A8898}" type="pres">
       <dgm:prSet presAssocID="{F33A5086-A1FF-184B-9C93-DFF547067F95}" presName="connectorText" presStyleLbl="sibTrans2D1" presStyleIdx="2" presStyleCnt="3"/>
       <dgm:spPr/>
+      <dgm:t>
+        <a:bodyPr/>
+        <a:lstStyle/>
+        <a:p>
+          <a:endParaRPr lang="en-US"/>
+        </a:p>
+      </dgm:t>
     </dgm:pt>
     <dgm:pt modelId="{9BB4FE60-0C01-9E4B-9EA9-15C0D0A51983}" type="pres">
       <dgm:prSet presAssocID="{312BD815-C8E9-9B46-9B9E-4305C593FD1B}" presName="node" presStyleLbl="node1" presStyleIdx="3" presStyleCnt="4">
@@ -4681,38 +4765,45 @@
         </dgm:presLayoutVars>
       </dgm:prSet>
       <dgm:spPr/>
+      <dgm:t>
+        <a:bodyPr/>
+        <a:lstStyle/>
+        <a:p>
+          <a:endParaRPr lang="en-US"/>
+        </a:p>
+      </dgm:t>
     </dgm:pt>
   </dgm:ptLst>
   <dgm:cxnLst>
-    <dgm:cxn modelId="{D879B464-1795-1A42-82F5-B285E6E91BA7}" type="presOf" srcId="{507A16A0-48F1-C641-8484-C37907052096}" destId="{990474B0-CFFA-3940-A167-1C826577395D}" srcOrd="0" destOrd="2" presId="urn:microsoft.com/office/officeart/2005/8/layout/process1"/>
-    <dgm:cxn modelId="{293C0855-F4ED-A747-B113-F45E9E421049}" srcId="{312BD815-C8E9-9B46-9B9E-4305C593FD1B}" destId="{F36872F4-7925-BC4F-9BF7-7AA897442F97}" srcOrd="0" destOrd="0" parTransId="{A518746E-1278-3546-9E67-0E89387BCD84}" sibTransId="{50D194C8-50E4-894C-8353-E74B1018B94D}"/>
-    <dgm:cxn modelId="{8D485AFB-6AE2-CA41-94EF-F91F35EDD050}" type="presOf" srcId="{0396D1A3-D4F7-8C47-AED2-BFEDE4DB086A}" destId="{990474B0-CFFA-3940-A167-1C826577395D}" srcOrd="0" destOrd="0" presId="urn:microsoft.com/office/officeart/2005/8/layout/process1"/>
+    <dgm:cxn modelId="{F41118E0-7200-CD41-9E30-44C0AE3C3C5C}" type="presOf" srcId="{A39D171C-5043-DD4B-AA25-B6B444FA914D}" destId="{3A6ED4CC-B098-9147-8E3B-3F526EDD15F7}" srcOrd="0" destOrd="2" presId="urn:microsoft.com/office/officeart/2005/8/layout/process1"/>
+    <dgm:cxn modelId="{19EE688C-2455-5742-A507-88EC7CAB0B81}" type="presOf" srcId="{74DFB14E-D571-BA4D-BFB4-3B96439B0008}" destId="{340920B6-0814-CC4A-A269-3E1426A6FAB4}" srcOrd="0" destOrd="0" presId="urn:microsoft.com/office/officeart/2005/8/layout/process1"/>
+    <dgm:cxn modelId="{6EE72707-236F-6F4C-8866-856A8C203092}" type="presOf" srcId="{02AF8EE1-14D4-CA4B-8D3E-382ACBEF7295}" destId="{3A6ED4CC-B098-9147-8E3B-3F526EDD15F7}" srcOrd="0" destOrd="1" presId="urn:microsoft.com/office/officeart/2005/8/layout/process1"/>
+    <dgm:cxn modelId="{72269A0C-BEE8-274C-9DF0-091C89FC21AD}" type="presOf" srcId="{0EFD6272-B740-E84F-91F9-C45CC3AABC7C}" destId="{14A88C18-AA4E-BD4D-B803-53276C2256FF}" srcOrd="0" destOrd="1" presId="urn:microsoft.com/office/officeart/2005/8/layout/process1"/>
+    <dgm:cxn modelId="{544BCBA1-A91A-CC42-8F1F-10501817AD57}" type="presOf" srcId="{312BD815-C8E9-9B46-9B9E-4305C593FD1B}" destId="{9BB4FE60-0C01-9E4B-9EA9-15C0D0A51983}" srcOrd="0" destOrd="0" presId="urn:microsoft.com/office/officeart/2005/8/layout/process1"/>
     <dgm:cxn modelId="{9E51536E-CD83-2E48-A10A-B888DF3EACB8}" srcId="{B04196DF-31B7-B140-9353-90A506618B31}" destId="{A39D171C-5043-DD4B-AA25-B6B444FA914D}" srcOrd="1" destOrd="0" parTransId="{6134CDEA-D87D-CC46-824F-D2DFFF8911E0}" sibTransId="{5C0ABBCD-CCD9-7741-9B3C-EBECEC3DEDE2}"/>
     <dgm:cxn modelId="{82ABEFCF-36EE-574E-9CDB-C7F8C762F2B2}" srcId="{8C985AD4-9E86-B04D-BBB7-D3B639B645CB}" destId="{312BD815-C8E9-9B46-9B9E-4305C593FD1B}" srcOrd="3" destOrd="0" parTransId="{EC711026-27CC-7B4E-BE23-EF6D06CE652C}" sibTransId="{3E038C7E-609D-9D44-AF70-285D8559EE22}"/>
+    <dgm:cxn modelId="{9812F346-3221-0D4C-9CAE-9165E4CE8EEA}" srcId="{0396D1A3-D4F7-8C47-AED2-BFEDE4DB086A}" destId="{939AFDE4-ECD4-BB4F-84C1-A5F4560785EE}" srcOrd="0" destOrd="0" parTransId="{9CBBB1F5-9FF7-EB45-AABB-DA6AA5BF50F0}" sibTransId="{389E5696-FC6C-6F4B-8D03-8730DFCFFC7D}"/>
+    <dgm:cxn modelId="{293C0855-F4ED-A747-B113-F45E9E421049}" srcId="{312BD815-C8E9-9B46-9B9E-4305C593FD1B}" destId="{F36872F4-7925-BC4F-9BF7-7AA897442F97}" srcOrd="0" destOrd="0" parTransId="{A518746E-1278-3546-9E67-0E89387BCD84}" sibTransId="{50D194C8-50E4-894C-8353-E74B1018B94D}"/>
+    <dgm:cxn modelId="{073D2AE7-15A3-0C4F-906D-487AB6B9BDF6}" srcId="{8C985AD4-9E86-B04D-BBB7-D3B639B645CB}" destId="{B04196DF-31B7-B140-9353-90A506618B31}" srcOrd="1" destOrd="0" parTransId="{D532DB2E-089D-8A40-8712-BE36A653F3A2}" sibTransId="{74DFB14E-D571-BA4D-BFB4-3B96439B0008}"/>
+    <dgm:cxn modelId="{62DA14E7-D9E6-9448-B16E-17BF703E5D58}" type="presOf" srcId="{F36872F4-7925-BC4F-9BF7-7AA897442F97}" destId="{9BB4FE60-0C01-9E4B-9EA9-15C0D0A51983}" srcOrd="0" destOrd="1" presId="urn:microsoft.com/office/officeart/2005/8/layout/process1"/>
+    <dgm:cxn modelId="{60D1176E-319C-404F-A06E-19C8E1192795}" srcId="{8C985AD4-9E86-B04D-BBB7-D3B639B645CB}" destId="{0396D1A3-D4F7-8C47-AED2-BFEDE4DB086A}" srcOrd="2" destOrd="0" parTransId="{A59E0B06-76EC-3A4F-A00F-30E5445F5A4D}" sibTransId="{F33A5086-A1FF-184B-9C93-DFF547067F95}"/>
+    <dgm:cxn modelId="{E30E57E5-0C61-DE40-9467-90126160AB82}" type="presOf" srcId="{E28A434D-72B9-D649-8DB9-55AC5841DF42}" destId="{BF28F2E6-7193-234F-8FB1-AAF2A3EBE557}" srcOrd="1" destOrd="0" presId="urn:microsoft.com/office/officeart/2005/8/layout/process1"/>
+    <dgm:cxn modelId="{535A3852-31DF-4649-B55B-E46B2392CB7F}" srcId="{8C985AD4-9E86-B04D-BBB7-D3B639B645CB}" destId="{9642E894-8B60-944D-B4F6-E9F5F2594064}" srcOrd="0" destOrd="0" parTransId="{C8344657-9824-7A43-BD2B-E4D093FDF8A8}" sibTransId="{E28A434D-72B9-D649-8DB9-55AC5841DF42}"/>
+    <dgm:cxn modelId="{7303D779-A263-4243-9AB2-D64AB7C30750}" srcId="{9642E894-8B60-944D-B4F6-E9F5F2594064}" destId="{0EFD6272-B740-E84F-91F9-C45CC3AABC7C}" srcOrd="0" destOrd="0" parTransId="{1F17CC2C-DAC1-1F44-A742-85A529D0BA2B}" sibTransId="{16743C91-E4E4-A14B-A150-311EB7F3B15E}"/>
+    <dgm:cxn modelId="{A6910DA3-D57B-E141-BF72-57D548806C77}" type="presOf" srcId="{B04196DF-31B7-B140-9353-90A506618B31}" destId="{3A6ED4CC-B098-9147-8E3B-3F526EDD15F7}" srcOrd="0" destOrd="0" presId="urn:microsoft.com/office/officeart/2005/8/layout/process1"/>
+    <dgm:cxn modelId="{AE507622-2A3D-0E43-8CE5-6A2AC4BF0230}" type="presOf" srcId="{0F31D03D-E524-6543-A996-A9D25B597C25}" destId="{14A88C18-AA4E-BD4D-B803-53276C2256FF}" srcOrd="0" destOrd="2" presId="urn:microsoft.com/office/officeart/2005/8/layout/process1"/>
+    <dgm:cxn modelId="{9BC93C0B-68A2-1C4E-9EF4-272F929B3AA9}" type="presOf" srcId="{74DFB14E-D571-BA4D-BFB4-3B96439B0008}" destId="{A304CD21-B01F-6641-AAB1-ADA2649AEB18}" srcOrd="1" destOrd="0" presId="urn:microsoft.com/office/officeart/2005/8/layout/process1"/>
+    <dgm:cxn modelId="{8D485AFB-6AE2-CA41-94EF-F91F35EDD050}" type="presOf" srcId="{0396D1A3-D4F7-8C47-AED2-BFEDE4DB086A}" destId="{990474B0-CFFA-3940-A167-1C826577395D}" srcOrd="0" destOrd="0" presId="urn:microsoft.com/office/officeart/2005/8/layout/process1"/>
+    <dgm:cxn modelId="{CECA2996-EBD6-5F46-84D8-CCC2474DE86B}" type="presOf" srcId="{F33A5086-A1FF-184B-9C93-DFF547067F95}" destId="{488AEF68-A75B-DC48-8393-94944E4642FF}" srcOrd="0" destOrd="0" presId="urn:microsoft.com/office/officeart/2005/8/layout/process1"/>
+    <dgm:cxn modelId="{D879B464-1795-1A42-82F5-B285E6E91BA7}" type="presOf" srcId="{507A16A0-48F1-C641-8484-C37907052096}" destId="{990474B0-CFFA-3940-A167-1C826577395D}" srcOrd="0" destOrd="2" presId="urn:microsoft.com/office/officeart/2005/8/layout/process1"/>
+    <dgm:cxn modelId="{CA75A4E5-EC9C-044C-968B-E8F3F5702B58}" type="presOf" srcId="{9642E894-8B60-944D-B4F6-E9F5F2594064}" destId="{14A88C18-AA4E-BD4D-B803-53276C2256FF}" srcOrd="0" destOrd="0" presId="urn:microsoft.com/office/officeart/2005/8/layout/process1"/>
     <dgm:cxn modelId="{B38AB6A4-801A-844B-B7DC-453AF6F44858}" type="presOf" srcId="{939AFDE4-ECD4-BB4F-84C1-A5F4560785EE}" destId="{990474B0-CFFA-3940-A167-1C826577395D}" srcOrd="0" destOrd="1" presId="urn:microsoft.com/office/officeart/2005/8/layout/process1"/>
+    <dgm:cxn modelId="{D058860E-4862-5F4D-92B1-1ECFE373AA59}" srcId="{B04196DF-31B7-B140-9353-90A506618B31}" destId="{02AF8EE1-14D4-CA4B-8D3E-382ACBEF7295}" srcOrd="0" destOrd="0" parTransId="{ECB2AC98-5482-F648-9C26-0652782AE752}" sibTransId="{91F032E0-825E-EA41-9FE6-DA5D03E65C96}"/>
+    <dgm:cxn modelId="{3C1295AB-D6E1-334B-B4DD-C9F5EB012B21}" type="presOf" srcId="{F33A5086-A1FF-184B-9C93-DFF547067F95}" destId="{F7ECEAE8-7A8E-A34C-9E9D-75EAFB0A8898}" srcOrd="1" destOrd="0" presId="urn:microsoft.com/office/officeart/2005/8/layout/process1"/>
+    <dgm:cxn modelId="{438C6D98-A103-9147-9206-45C53380BE1C}" type="presOf" srcId="{8C985AD4-9E86-B04D-BBB7-D3B639B645CB}" destId="{F4C2CDDE-57E9-2146-968A-B1C7A1571F97}" srcOrd="0" destOrd="0" presId="urn:microsoft.com/office/officeart/2005/8/layout/process1"/>
+    <dgm:cxn modelId="{434760FF-FDD6-AF4B-8678-2F4F904B8CFD}" type="presOf" srcId="{E28A434D-72B9-D649-8DB9-55AC5841DF42}" destId="{6284B464-1A7B-D444-A2BE-E2E521ACCCB8}" srcOrd="0" destOrd="0" presId="urn:microsoft.com/office/officeart/2005/8/layout/process1"/>
     <dgm:cxn modelId="{D7C5D51A-10C0-0E4D-A371-BF8B939A67A8}" srcId="{9642E894-8B60-944D-B4F6-E9F5F2594064}" destId="{0F31D03D-E524-6543-A996-A9D25B597C25}" srcOrd="1" destOrd="0" parTransId="{F12FFA09-BC22-B14B-BB86-5BDB75C4A7FB}" sibTransId="{9525385A-D13C-4148-9CE2-B49B534D30C5}"/>
-    <dgm:cxn modelId="{073D2AE7-15A3-0C4F-906D-487AB6B9BDF6}" srcId="{8C985AD4-9E86-B04D-BBB7-D3B639B645CB}" destId="{B04196DF-31B7-B140-9353-90A506618B31}" srcOrd="1" destOrd="0" parTransId="{D532DB2E-089D-8A40-8712-BE36A653F3A2}" sibTransId="{74DFB14E-D571-BA4D-BFB4-3B96439B0008}"/>
-    <dgm:cxn modelId="{434760FF-FDD6-AF4B-8678-2F4F904B8CFD}" type="presOf" srcId="{E28A434D-72B9-D649-8DB9-55AC5841DF42}" destId="{6284B464-1A7B-D444-A2BE-E2E521ACCCB8}" srcOrd="0" destOrd="0" presId="urn:microsoft.com/office/officeart/2005/8/layout/process1"/>
-    <dgm:cxn modelId="{F41118E0-7200-CD41-9E30-44C0AE3C3C5C}" type="presOf" srcId="{A39D171C-5043-DD4B-AA25-B6B444FA914D}" destId="{3A6ED4CC-B098-9147-8E3B-3F526EDD15F7}" srcOrd="0" destOrd="2" presId="urn:microsoft.com/office/officeart/2005/8/layout/process1"/>
-    <dgm:cxn modelId="{438C6D98-A103-9147-9206-45C53380BE1C}" type="presOf" srcId="{8C985AD4-9E86-B04D-BBB7-D3B639B645CB}" destId="{F4C2CDDE-57E9-2146-968A-B1C7A1571F97}" srcOrd="0" destOrd="0" presId="urn:microsoft.com/office/officeart/2005/8/layout/process1"/>
-    <dgm:cxn modelId="{544BCBA1-A91A-CC42-8F1F-10501817AD57}" type="presOf" srcId="{312BD815-C8E9-9B46-9B9E-4305C593FD1B}" destId="{9BB4FE60-0C01-9E4B-9EA9-15C0D0A51983}" srcOrd="0" destOrd="0" presId="urn:microsoft.com/office/officeart/2005/8/layout/process1"/>
-    <dgm:cxn modelId="{9812F346-3221-0D4C-9CAE-9165E4CE8EEA}" srcId="{0396D1A3-D4F7-8C47-AED2-BFEDE4DB086A}" destId="{939AFDE4-ECD4-BB4F-84C1-A5F4560785EE}" srcOrd="0" destOrd="0" parTransId="{9CBBB1F5-9FF7-EB45-AABB-DA6AA5BF50F0}" sibTransId="{389E5696-FC6C-6F4B-8D03-8730DFCFFC7D}"/>
-    <dgm:cxn modelId="{72269A0C-BEE8-274C-9DF0-091C89FC21AD}" type="presOf" srcId="{0EFD6272-B740-E84F-91F9-C45CC3AABC7C}" destId="{14A88C18-AA4E-BD4D-B803-53276C2256FF}" srcOrd="0" destOrd="1" presId="urn:microsoft.com/office/officeart/2005/8/layout/process1"/>
-    <dgm:cxn modelId="{AE507622-2A3D-0E43-8CE5-6A2AC4BF0230}" type="presOf" srcId="{0F31D03D-E524-6543-A996-A9D25B597C25}" destId="{14A88C18-AA4E-BD4D-B803-53276C2256FF}" srcOrd="0" destOrd="2" presId="urn:microsoft.com/office/officeart/2005/8/layout/process1"/>
-    <dgm:cxn modelId="{62DA14E7-D9E6-9448-B16E-17BF703E5D58}" type="presOf" srcId="{F36872F4-7925-BC4F-9BF7-7AA897442F97}" destId="{9BB4FE60-0C01-9E4B-9EA9-15C0D0A51983}" srcOrd="0" destOrd="1" presId="urn:microsoft.com/office/officeart/2005/8/layout/process1"/>
-    <dgm:cxn modelId="{CA75A4E5-EC9C-044C-968B-E8F3F5702B58}" type="presOf" srcId="{9642E894-8B60-944D-B4F6-E9F5F2594064}" destId="{14A88C18-AA4E-BD4D-B803-53276C2256FF}" srcOrd="0" destOrd="0" presId="urn:microsoft.com/office/officeart/2005/8/layout/process1"/>
     <dgm:cxn modelId="{9996873D-9F4F-8244-AB17-A0520BA11772}" srcId="{0396D1A3-D4F7-8C47-AED2-BFEDE4DB086A}" destId="{507A16A0-48F1-C641-8484-C37907052096}" srcOrd="1" destOrd="0" parTransId="{F1BF6972-336B-584B-997D-1DBE4944961A}" sibTransId="{BEDFBA46-1D5E-AF4E-B0A3-DD415361B564}"/>
-    <dgm:cxn modelId="{9BC93C0B-68A2-1C4E-9EF4-272F929B3AA9}" type="presOf" srcId="{74DFB14E-D571-BA4D-BFB4-3B96439B0008}" destId="{A304CD21-B01F-6641-AAB1-ADA2649AEB18}" srcOrd="1" destOrd="0" presId="urn:microsoft.com/office/officeart/2005/8/layout/process1"/>
-    <dgm:cxn modelId="{CECA2996-EBD6-5F46-84D8-CCC2474DE86B}" type="presOf" srcId="{F33A5086-A1FF-184B-9C93-DFF547067F95}" destId="{488AEF68-A75B-DC48-8393-94944E4642FF}" srcOrd="0" destOrd="0" presId="urn:microsoft.com/office/officeart/2005/8/layout/process1"/>
-    <dgm:cxn modelId="{3C1295AB-D6E1-334B-B4DD-C9F5EB012B21}" type="presOf" srcId="{F33A5086-A1FF-184B-9C93-DFF547067F95}" destId="{F7ECEAE8-7A8E-A34C-9E9D-75EAFB0A8898}" srcOrd="1" destOrd="0" presId="urn:microsoft.com/office/officeart/2005/8/layout/process1"/>
-    <dgm:cxn modelId="{19EE688C-2455-5742-A507-88EC7CAB0B81}" type="presOf" srcId="{74DFB14E-D571-BA4D-BFB4-3B96439B0008}" destId="{340920B6-0814-CC4A-A269-3E1426A6FAB4}" srcOrd="0" destOrd="0" presId="urn:microsoft.com/office/officeart/2005/8/layout/process1"/>
-    <dgm:cxn modelId="{7303D779-A263-4243-9AB2-D64AB7C30750}" srcId="{9642E894-8B60-944D-B4F6-E9F5F2594064}" destId="{0EFD6272-B740-E84F-91F9-C45CC3AABC7C}" srcOrd="0" destOrd="0" parTransId="{1F17CC2C-DAC1-1F44-A742-85A529D0BA2B}" sibTransId="{16743C91-E4E4-A14B-A150-311EB7F3B15E}"/>
-    <dgm:cxn modelId="{6EE72707-236F-6F4C-8866-856A8C203092}" type="presOf" srcId="{02AF8EE1-14D4-CA4B-8D3E-382ACBEF7295}" destId="{3A6ED4CC-B098-9147-8E3B-3F526EDD15F7}" srcOrd="0" destOrd="1" presId="urn:microsoft.com/office/officeart/2005/8/layout/process1"/>
-    <dgm:cxn modelId="{D058860E-4862-5F4D-92B1-1ECFE373AA59}" srcId="{B04196DF-31B7-B140-9353-90A506618B31}" destId="{02AF8EE1-14D4-CA4B-8D3E-382ACBEF7295}" srcOrd="0" destOrd="0" parTransId="{ECB2AC98-5482-F648-9C26-0652782AE752}" sibTransId="{91F032E0-825E-EA41-9FE6-DA5D03E65C96}"/>
-    <dgm:cxn modelId="{60D1176E-319C-404F-A06E-19C8E1192795}" srcId="{8C985AD4-9E86-B04D-BBB7-D3B639B645CB}" destId="{0396D1A3-D4F7-8C47-AED2-BFEDE4DB086A}" srcOrd="2" destOrd="0" parTransId="{A59E0B06-76EC-3A4F-A00F-30E5445F5A4D}" sibTransId="{F33A5086-A1FF-184B-9C93-DFF547067F95}"/>
-    <dgm:cxn modelId="{535A3852-31DF-4649-B55B-E46B2392CB7F}" srcId="{8C985AD4-9E86-B04D-BBB7-D3B639B645CB}" destId="{9642E894-8B60-944D-B4F6-E9F5F2594064}" srcOrd="0" destOrd="0" parTransId="{C8344657-9824-7A43-BD2B-E4D093FDF8A8}" sibTransId="{E28A434D-72B9-D649-8DB9-55AC5841DF42}"/>
-    <dgm:cxn modelId="{E30E57E5-0C61-DE40-9467-90126160AB82}" type="presOf" srcId="{E28A434D-72B9-D649-8DB9-55AC5841DF42}" destId="{BF28F2E6-7193-234F-8FB1-AAF2A3EBE557}" srcOrd="1" destOrd="0" presId="urn:microsoft.com/office/officeart/2005/8/layout/process1"/>
-    <dgm:cxn modelId="{A6910DA3-D57B-E141-BF72-57D548806C77}" type="presOf" srcId="{B04196DF-31B7-B140-9353-90A506618B31}" destId="{3A6ED4CC-B098-9147-8E3B-3F526EDD15F7}" srcOrd="0" destOrd="0" presId="urn:microsoft.com/office/officeart/2005/8/layout/process1"/>
     <dgm:cxn modelId="{F9AE6271-87F8-1344-BCA5-4DCBA523B7EC}" type="presParOf" srcId="{F4C2CDDE-57E9-2146-968A-B1C7A1571F97}" destId="{14A88C18-AA4E-BD4D-B803-53276C2256FF}" srcOrd="0" destOrd="0" presId="urn:microsoft.com/office/officeart/2005/8/layout/process1"/>
     <dgm:cxn modelId="{9C04A97C-DCF1-734C-A883-E078D6DCF587}" type="presParOf" srcId="{F4C2CDDE-57E9-2146-968A-B1C7A1571F97}" destId="{6284B464-1A7B-D444-A2BE-E2E521ACCCB8}" srcOrd="1" destOrd="0" presId="urn:microsoft.com/office/officeart/2005/8/layout/process1"/>
     <dgm:cxn modelId="{6F166435-BFE6-1C42-90B9-05D423DA388B}" type="presParOf" srcId="{6284B464-1A7B-D444-A2BE-E2E521ACCCB8}" destId="{BF28F2E6-7193-234F-8FB1-AAF2A3EBE557}" srcOrd="0" destOrd="0" presId="urn:microsoft.com/office/officeart/2005/8/layout/process1"/>
@@ -4990,6 +5081,13 @@
         </dgm:presLayoutVars>
       </dgm:prSet>
       <dgm:spPr/>
+      <dgm:t>
+        <a:bodyPr/>
+        <a:lstStyle/>
+        <a:p>
+          <a:endParaRPr lang="en-US"/>
+        </a:p>
+      </dgm:t>
     </dgm:pt>
     <dgm:pt modelId="{14A88C18-AA4E-BD4D-B803-53276C2256FF}" type="pres">
       <dgm:prSet presAssocID="{9642E894-8B60-944D-B4F6-E9F5F2594064}" presName="node" presStyleLbl="node1" presStyleIdx="0" presStyleCnt="2">
@@ -4998,14 +5096,35 @@
         </dgm:presLayoutVars>
       </dgm:prSet>
       <dgm:spPr/>
+      <dgm:t>
+        <a:bodyPr/>
+        <a:lstStyle/>
+        <a:p>
+          <a:endParaRPr lang="en-US"/>
+        </a:p>
+      </dgm:t>
     </dgm:pt>
     <dgm:pt modelId="{6284B464-1A7B-D444-A2BE-E2E521ACCCB8}" type="pres">
       <dgm:prSet presAssocID="{E28A434D-72B9-D649-8DB9-55AC5841DF42}" presName="sibTrans" presStyleLbl="sibTrans2D1" presStyleIdx="0" presStyleCnt="1"/>
       <dgm:spPr/>
+      <dgm:t>
+        <a:bodyPr/>
+        <a:lstStyle/>
+        <a:p>
+          <a:endParaRPr lang="en-US"/>
+        </a:p>
+      </dgm:t>
     </dgm:pt>
     <dgm:pt modelId="{BF28F2E6-7193-234F-8FB1-AAF2A3EBE557}" type="pres">
       <dgm:prSet presAssocID="{E28A434D-72B9-D649-8DB9-55AC5841DF42}" presName="connectorText" presStyleLbl="sibTrans2D1" presStyleIdx="0" presStyleCnt="1"/>
       <dgm:spPr/>
+      <dgm:t>
+        <a:bodyPr/>
+        <a:lstStyle/>
+        <a:p>
+          <a:endParaRPr lang="en-US"/>
+        </a:p>
+      </dgm:t>
     </dgm:pt>
     <dgm:pt modelId="{3A6ED4CC-B098-9147-8E3B-3F526EDD15F7}" type="pres">
       <dgm:prSet presAssocID="{B04196DF-31B7-B140-9353-90A506618B31}" presName="node" presStyleLbl="node1" presStyleIdx="1" presStyleCnt="2">
@@ -5310,6 +5429,13 @@
         </dgm:presLayoutVars>
       </dgm:prSet>
       <dgm:spPr/>
+      <dgm:t>
+        <a:bodyPr/>
+        <a:lstStyle/>
+        <a:p>
+          <a:endParaRPr lang="en-US"/>
+        </a:p>
+      </dgm:t>
     </dgm:pt>
     <dgm:pt modelId="{14A88C18-AA4E-BD4D-B803-53276C2256FF}" type="pres">
       <dgm:prSet presAssocID="{9642E894-8B60-944D-B4F6-E9F5F2594064}" presName="node" presStyleLbl="node1" presStyleIdx="0" presStyleCnt="2">
@@ -5318,14 +5444,35 @@
         </dgm:presLayoutVars>
       </dgm:prSet>
       <dgm:spPr/>
+      <dgm:t>
+        <a:bodyPr/>
+        <a:lstStyle/>
+        <a:p>
+          <a:endParaRPr lang="en-US"/>
+        </a:p>
+      </dgm:t>
     </dgm:pt>
     <dgm:pt modelId="{6284B464-1A7B-D444-A2BE-E2E521ACCCB8}" type="pres">
       <dgm:prSet presAssocID="{E28A434D-72B9-D649-8DB9-55AC5841DF42}" presName="sibTrans" presStyleLbl="sibTrans2D1" presStyleIdx="0" presStyleCnt="1"/>
       <dgm:spPr/>
+      <dgm:t>
+        <a:bodyPr/>
+        <a:lstStyle/>
+        <a:p>
+          <a:endParaRPr lang="en-US"/>
+        </a:p>
+      </dgm:t>
     </dgm:pt>
     <dgm:pt modelId="{BF28F2E6-7193-234F-8FB1-AAF2A3EBE557}" type="pres">
       <dgm:prSet presAssocID="{E28A434D-72B9-D649-8DB9-55AC5841DF42}" presName="connectorText" presStyleLbl="sibTrans2D1" presStyleIdx="0" presStyleCnt="1"/>
       <dgm:spPr/>
+      <dgm:t>
+        <a:bodyPr/>
+        <a:lstStyle/>
+        <a:p>
+          <a:endParaRPr lang="en-US"/>
+        </a:p>
+      </dgm:t>
     </dgm:pt>
     <dgm:pt modelId="{3A6ED4CC-B098-9147-8E3B-3F526EDD15F7}" type="pres">
       <dgm:prSet presAssocID="{B04196DF-31B7-B140-9353-90A506618B31}" presName="node" presStyleLbl="node1" presStyleIdx="1" presStyleCnt="2">
@@ -5351,8 +5498,8 @@
     <dgm:cxn modelId="{535A3852-31DF-4649-B55B-E46B2392CB7F}" srcId="{8C985AD4-9E86-B04D-BBB7-D3B639B645CB}" destId="{9642E894-8B60-944D-B4F6-E9F5F2594064}" srcOrd="0" destOrd="0" parTransId="{C8344657-9824-7A43-BD2B-E4D093FDF8A8}" sibTransId="{E28A434D-72B9-D649-8DB9-55AC5841DF42}"/>
     <dgm:cxn modelId="{9D4C58B9-BF81-3D4C-87CA-53D436090C0C}" type="presOf" srcId="{0EFD6272-B740-E84F-91F9-C45CC3AABC7C}" destId="{14A88C18-AA4E-BD4D-B803-53276C2256FF}" srcOrd="0" destOrd="1" presId="urn:microsoft.com/office/officeart/2005/8/layout/process1"/>
     <dgm:cxn modelId="{073D2AE7-15A3-0C4F-906D-487AB6B9BDF6}" srcId="{8C985AD4-9E86-B04D-BBB7-D3B639B645CB}" destId="{B04196DF-31B7-B140-9353-90A506618B31}" srcOrd="1" destOrd="0" parTransId="{D532DB2E-089D-8A40-8712-BE36A653F3A2}" sibTransId="{74DFB14E-D571-BA4D-BFB4-3B96439B0008}"/>
+    <dgm:cxn modelId="{C3CE29F7-AD66-F84F-A52C-33CAD280AA99}" type="presOf" srcId="{0F31D03D-E524-6543-A996-A9D25B597C25}" destId="{14A88C18-AA4E-BD4D-B803-53276C2256FF}" srcOrd="0" destOrd="2" presId="urn:microsoft.com/office/officeart/2005/8/layout/process1"/>
     <dgm:cxn modelId="{39C74F0C-2F56-B746-AE94-942F8B91B273}" type="presOf" srcId="{02AF8EE1-14D4-CA4B-8D3E-382ACBEF7295}" destId="{3A6ED4CC-B098-9147-8E3B-3F526EDD15F7}" srcOrd="0" destOrd="1" presId="urn:microsoft.com/office/officeart/2005/8/layout/process1"/>
-    <dgm:cxn modelId="{C3CE29F7-AD66-F84F-A52C-33CAD280AA99}" type="presOf" srcId="{0F31D03D-E524-6543-A996-A9D25B597C25}" destId="{14A88C18-AA4E-BD4D-B803-53276C2256FF}" srcOrd="0" destOrd="2" presId="urn:microsoft.com/office/officeart/2005/8/layout/process1"/>
     <dgm:cxn modelId="{D058860E-4862-5F4D-92B1-1ECFE373AA59}" srcId="{B04196DF-31B7-B140-9353-90A506618B31}" destId="{02AF8EE1-14D4-CA4B-8D3E-382ACBEF7295}" srcOrd="0" destOrd="0" parTransId="{ECB2AC98-5482-F648-9C26-0652782AE752}" sibTransId="{91F032E0-825E-EA41-9FE6-DA5D03E65C96}"/>
     <dgm:cxn modelId="{9E51536E-CD83-2E48-A10A-B888DF3EACB8}" srcId="{B04196DF-31B7-B140-9353-90A506618B31}" destId="{A39D171C-5043-DD4B-AA25-B6B444FA914D}" srcOrd="1" destOrd="0" parTransId="{6134CDEA-D87D-CC46-824F-D2DFFF8911E0}" sibTransId="{5C0ABBCD-CCD9-7741-9B3C-EBECEC3DEDE2}"/>
     <dgm:cxn modelId="{A14A206B-05C8-0A4C-949D-D5CBD45036AB}" type="presOf" srcId="{E28A434D-72B9-D649-8DB9-55AC5841DF42}" destId="{6284B464-1A7B-D444-A2BE-E2E521ACCCB8}" srcOrd="0" destOrd="0" presId="urn:microsoft.com/office/officeart/2005/8/layout/process1"/>
@@ -5630,6 +5777,13 @@
         </dgm:presLayoutVars>
       </dgm:prSet>
       <dgm:spPr/>
+      <dgm:t>
+        <a:bodyPr/>
+        <a:lstStyle/>
+        <a:p>
+          <a:endParaRPr lang="en-US"/>
+        </a:p>
+      </dgm:t>
     </dgm:pt>
     <dgm:pt modelId="{14A88C18-AA4E-BD4D-B803-53276C2256FF}" type="pres">
       <dgm:prSet presAssocID="{9642E894-8B60-944D-B4F6-E9F5F2594064}" presName="node" presStyleLbl="node1" presStyleIdx="0" presStyleCnt="2">
@@ -5638,14 +5792,35 @@
         </dgm:presLayoutVars>
       </dgm:prSet>
       <dgm:spPr/>
+      <dgm:t>
+        <a:bodyPr/>
+        <a:lstStyle/>
+        <a:p>
+          <a:endParaRPr lang="en-US"/>
+        </a:p>
+      </dgm:t>
     </dgm:pt>
     <dgm:pt modelId="{6284B464-1A7B-D444-A2BE-E2E521ACCCB8}" type="pres">
       <dgm:prSet presAssocID="{E28A434D-72B9-D649-8DB9-55AC5841DF42}" presName="sibTrans" presStyleLbl="sibTrans2D1" presStyleIdx="0" presStyleCnt="1"/>
       <dgm:spPr/>
+      <dgm:t>
+        <a:bodyPr/>
+        <a:lstStyle/>
+        <a:p>
+          <a:endParaRPr lang="en-US"/>
+        </a:p>
+      </dgm:t>
     </dgm:pt>
     <dgm:pt modelId="{BF28F2E6-7193-234F-8FB1-AAF2A3EBE557}" type="pres">
       <dgm:prSet presAssocID="{E28A434D-72B9-D649-8DB9-55AC5841DF42}" presName="connectorText" presStyleLbl="sibTrans2D1" presStyleIdx="0" presStyleCnt="1"/>
       <dgm:spPr/>
+      <dgm:t>
+        <a:bodyPr/>
+        <a:lstStyle/>
+        <a:p>
+          <a:endParaRPr lang="en-US"/>
+        </a:p>
+      </dgm:t>
     </dgm:pt>
     <dgm:pt modelId="{3A6ED4CC-B098-9147-8E3B-3F526EDD15F7}" type="pres">
       <dgm:prSet presAssocID="{B04196DF-31B7-B140-9353-90A506618B31}" presName="node" presStyleLbl="node1" presStyleIdx="1" presStyleCnt="2">
@@ -5670,8 +5845,8 @@
     <dgm:cxn modelId="{64FF3D34-4B9E-104B-82F9-0D4253D6AFDA}" type="presOf" srcId="{0F31D03D-E524-6543-A996-A9D25B597C25}" destId="{14A88C18-AA4E-BD4D-B803-53276C2256FF}" srcOrd="0" destOrd="2" presId="urn:microsoft.com/office/officeart/2005/8/layout/process1"/>
     <dgm:cxn modelId="{38E93DDC-C380-764D-9331-38DC2470D485}" type="presOf" srcId="{B04196DF-31B7-B140-9353-90A506618B31}" destId="{3A6ED4CC-B098-9147-8E3B-3F526EDD15F7}" srcOrd="0" destOrd="0" presId="urn:microsoft.com/office/officeart/2005/8/layout/process1"/>
     <dgm:cxn modelId="{7303D779-A263-4243-9AB2-D64AB7C30750}" srcId="{9642E894-8B60-944D-B4F6-E9F5F2594064}" destId="{0EFD6272-B740-E84F-91F9-C45CC3AABC7C}" srcOrd="0" destOrd="0" parTransId="{1F17CC2C-DAC1-1F44-A742-85A529D0BA2B}" sibTransId="{16743C91-E4E4-A14B-A150-311EB7F3B15E}"/>
+    <dgm:cxn modelId="{9FC8CAEC-9B5B-DD4C-9162-957011B1B283}" type="presOf" srcId="{9642E894-8B60-944D-B4F6-E9F5F2594064}" destId="{14A88C18-AA4E-BD4D-B803-53276C2256FF}" srcOrd="0" destOrd="0" presId="urn:microsoft.com/office/officeart/2005/8/layout/process1"/>
     <dgm:cxn modelId="{535A3852-31DF-4649-B55B-E46B2392CB7F}" srcId="{8C985AD4-9E86-B04D-BBB7-D3B639B645CB}" destId="{9642E894-8B60-944D-B4F6-E9F5F2594064}" srcOrd="0" destOrd="0" parTransId="{C8344657-9824-7A43-BD2B-E4D093FDF8A8}" sibTransId="{E28A434D-72B9-D649-8DB9-55AC5841DF42}"/>
-    <dgm:cxn modelId="{9FC8CAEC-9B5B-DD4C-9162-957011B1B283}" type="presOf" srcId="{9642E894-8B60-944D-B4F6-E9F5F2594064}" destId="{14A88C18-AA4E-BD4D-B803-53276C2256FF}" srcOrd="0" destOrd="0" presId="urn:microsoft.com/office/officeart/2005/8/layout/process1"/>
     <dgm:cxn modelId="{073D2AE7-15A3-0C4F-906D-487AB6B9BDF6}" srcId="{8C985AD4-9E86-B04D-BBB7-D3B639B645CB}" destId="{B04196DF-31B7-B140-9353-90A506618B31}" srcOrd="1" destOrd="0" parTransId="{D532DB2E-089D-8A40-8712-BE36A653F3A2}" sibTransId="{74DFB14E-D571-BA4D-BFB4-3B96439B0008}"/>
     <dgm:cxn modelId="{D058860E-4862-5F4D-92B1-1ECFE373AA59}" srcId="{B04196DF-31B7-B140-9353-90A506618B31}" destId="{02AF8EE1-14D4-CA4B-8D3E-382ACBEF7295}" srcOrd="0" destOrd="0" parTransId="{ECB2AC98-5482-F648-9C26-0652782AE752}" sibTransId="{91F032E0-825E-EA41-9FE6-DA5D03E65C96}"/>
     <dgm:cxn modelId="{9E51536E-CD83-2E48-A10A-B888DF3EACB8}" srcId="{B04196DF-31B7-B140-9353-90A506618B31}" destId="{A39D171C-5043-DD4B-AA25-B6B444FA914D}" srcOrd="1" destOrd="0" parTransId="{6134CDEA-D87D-CC46-824F-D2DFFF8911E0}" sibTransId="{5C0ABBCD-CCD9-7741-9B3C-EBECEC3DEDE2}"/>
@@ -14322,7 +14497,7 @@
             <a:fld id="{6E362620-0153-BF4A-8320-901ED9870E55}" type="datetimeFigureOut">
               <a:rPr lang="en-US" smtClean="0"/>
               <a:pPr/>
-              <a:t>9/7/12</a:t>
+              <a:t>9/8/12</a:t>
             </a:fld>
             <a:endParaRPr lang="en-US"/>
           </a:p>
@@ -14777,7 +14952,7 @@
             <a:fld id="{6E362620-0153-BF4A-8320-901ED9870E55}" type="datetimeFigureOut">
               <a:rPr lang="en-US" smtClean="0"/>
               <a:pPr/>
-              <a:t>9/7/12</a:t>
+              <a:t>9/8/12</a:t>
             </a:fld>
             <a:endParaRPr lang="en-US"/>
           </a:p>
@@ -15322,7 +15497,7 @@
             <a:fld id="{6E362620-0153-BF4A-8320-901ED9870E55}" type="datetimeFigureOut">
               <a:rPr lang="en-US" smtClean="0"/>
               <a:pPr/>
-              <a:t>9/7/12</a:t>
+              <a:t>9/8/12</a:t>
             </a:fld>
             <a:endParaRPr lang="en-US"/>
           </a:p>
@@ -15460,7 +15635,7 @@
             <a:fld id="{6E362620-0153-BF4A-8320-901ED9870E55}" type="datetimeFigureOut">
               <a:rPr lang="en-US" smtClean="0"/>
               <a:pPr/>
-              <a:t>9/7/12</a:t>
+              <a:t>9/8/12</a:t>
             </a:fld>
             <a:endParaRPr lang="en-US"/>
           </a:p>
@@ -15797,7 +15972,7 @@
             <a:fld id="{6E362620-0153-BF4A-8320-901ED9870E55}" type="datetimeFigureOut">
               <a:rPr lang="en-US" smtClean="0"/>
               <a:pPr/>
-              <a:t>9/7/12</a:t>
+              <a:t>9/8/12</a:t>
             </a:fld>
             <a:endParaRPr lang="en-US"/>
           </a:p>
@@ -16121,7 +16296,7 @@
             <a:fld id="{6E362620-0153-BF4A-8320-901ED9870E55}" type="datetimeFigureOut">
               <a:rPr lang="en-US" smtClean="0"/>
               <a:pPr/>
-              <a:t>9/7/12</a:t>
+              <a:t>9/8/12</a:t>
             </a:fld>
             <a:endParaRPr lang="en-US"/>
           </a:p>
@@ -16421,7 +16596,7 @@
             <a:fld id="{6E362620-0153-BF4A-8320-901ED9870E55}" type="datetimeFigureOut">
               <a:rPr lang="en-US" smtClean="0"/>
               <a:pPr/>
-              <a:t>9/7/12</a:t>
+              <a:t>9/8/12</a:t>
             </a:fld>
             <a:endParaRPr lang="en-US"/>
           </a:p>
@@ -16807,7 +16982,7 @@
             <a:fld id="{6E362620-0153-BF4A-8320-901ED9870E55}" type="datetimeFigureOut">
               <a:rPr lang="en-US" smtClean="0"/>
               <a:pPr/>
-              <a:t>9/7/12</a:t>
+              <a:t>9/8/12</a:t>
             </a:fld>
             <a:endParaRPr lang="en-US"/>
           </a:p>
@@ -17226,7 +17401,7 @@
             <a:fld id="{6E362620-0153-BF4A-8320-901ED9870E55}" type="datetimeFigureOut">
               <a:rPr lang="en-US" smtClean="0"/>
               <a:pPr/>
-              <a:t>9/7/12</a:t>
+              <a:t>9/8/12</a:t>
             </a:fld>
             <a:endParaRPr lang="en-US"/>
           </a:p>
@@ -17773,7 +17948,7 @@
             <a:fld id="{6E362620-0153-BF4A-8320-901ED9870E55}" type="datetimeFigureOut">
               <a:rPr lang="en-US" smtClean="0"/>
               <a:pPr/>
-              <a:t>9/7/12</a:t>
+              <a:t>9/8/12</a:t>
             </a:fld>
             <a:endParaRPr lang="en-US"/>
           </a:p>
@@ -18129,7 +18304,7 @@
             <a:fld id="{6E362620-0153-BF4A-8320-901ED9870E55}" type="datetimeFigureOut">
               <a:rPr lang="en-US" smtClean="0"/>
               <a:pPr/>
-              <a:t>9/7/12</a:t>
+              <a:t>9/8/12</a:t>
             </a:fld>
             <a:endParaRPr lang="en-US"/>
           </a:p>
@@ -18342,7 +18517,7 @@
             <a:fld id="{6E362620-0153-BF4A-8320-901ED9870E55}" type="datetimeFigureOut">
               <a:rPr lang="en-US" smtClean="0"/>
               <a:pPr/>
-              <a:t>9/7/12</a:t>
+              <a:t>9/8/12</a:t>
             </a:fld>
             <a:endParaRPr lang="en-US"/>
           </a:p>
@@ -18647,7 +18822,7 @@
             <a:fld id="{6E362620-0153-BF4A-8320-901ED9870E55}" type="datetimeFigureOut">
               <a:rPr lang="en-US" smtClean="0"/>
               <a:pPr/>
-              <a:t>9/7/12</a:t>
+              <a:t>9/8/12</a:t>
             </a:fld>
             <a:endParaRPr lang="en-US"/>
           </a:p>
@@ -18901,7 +19076,7 @@
             <a:fld id="{6E362620-0153-BF4A-8320-901ED9870E55}" type="datetimeFigureOut">
               <a:rPr lang="en-US" smtClean="0"/>
               <a:pPr/>
-              <a:t>9/7/12</a:t>
+              <a:t>9/8/12</a:t>
             </a:fld>
             <a:endParaRPr lang="en-US"/>
           </a:p>
@@ -19292,7 +19467,7 @@
             <a:fld id="{6E362620-0153-BF4A-8320-901ED9870E55}" type="datetimeFigureOut">
               <a:rPr lang="en-US" smtClean="0"/>
               <a:pPr/>
-              <a:t>9/7/12</a:t>
+              <a:t>9/8/12</a:t>
             </a:fld>
             <a:endParaRPr lang="en-US"/>
           </a:p>
@@ -19879,7 +20054,7 @@
             <a:fld id="{6E362620-0153-BF4A-8320-901ED9870E55}" type="datetimeFigureOut">
               <a:rPr lang="en-US" smtClean="0"/>
               <a:pPr/>
-              <a:t>9/7/12</a:t>
+              <a:t>9/8/12</a:t>
             </a:fld>
             <a:endParaRPr lang="en-US"/>
           </a:p>
@@ -20396,7 +20571,7 @@
             <a:fld id="{6E362620-0153-BF4A-8320-901ED9870E55}" type="datetimeFigureOut">
               <a:rPr lang="en-US" smtClean="0"/>
               <a:pPr/>
-              <a:t>9/7/12</a:t>
+              <a:t>9/8/12</a:t>
             </a:fld>
             <a:endParaRPr lang="en-US"/>
           </a:p>
@@ -20771,7 +20946,7 @@
             <a:fld id="{6E362620-0153-BF4A-8320-901ED9870E55}" type="datetimeFigureOut">
               <a:rPr lang="en-US" smtClean="0"/>
               <a:pPr/>
-              <a:t>9/7/12</a:t>
+              <a:t>9/8/12</a:t>
             </a:fld>
             <a:endParaRPr lang="en-US"/>
           </a:p>
@@ -21172,7 +21347,7 @@
             <a:fld id="{6E362620-0153-BF4A-8320-901ED9870E55}" type="datetimeFigureOut">
               <a:rPr lang="en-US" smtClean="0"/>
               <a:pPr/>
-              <a:t>9/7/12</a:t>
+              <a:t>9/8/12</a:t>
             </a:fld>
             <a:endParaRPr lang="en-US"/>
           </a:p>
@@ -21594,7 +21769,7 @@
             <a:fld id="{6E362620-0153-BF4A-8320-901ED9870E55}" type="datetimeFigureOut">
               <a:rPr lang="en-US" smtClean="0"/>
               <a:pPr/>
-              <a:t>9/7/12</a:t>
+              <a:t>9/8/12</a:t>
             </a:fld>
             <a:endParaRPr lang="en-US"/>
           </a:p>
@@ -21979,7 +22154,7 @@
             <a:fld id="{6E362620-0153-BF4A-8320-901ED9870E55}" type="datetimeFigureOut">
               <a:rPr lang="en-US" smtClean="0"/>
               <a:pPr/>
-              <a:t>9/7/12</a:t>
+              <a:t>9/8/12</a:t>
             </a:fld>
             <a:endParaRPr lang="en-US"/>
           </a:p>
@@ -22452,6 +22627,13 @@
   <p:clrMapOvr>
     <a:masterClrMapping/>
   </p:clrMapOvr>
+  <p:timing>
+    <p:tnLst>
+      <p:par>
+        <p:cTn id="1" dur="indefinite" restart="never" nodeType="tmRoot"/>
+      </p:par>
+    </p:tnLst>
+  </p:timing>
 </p:sld>
 </file>
 
@@ -22519,6 +22701,13 @@
   <p:clrMapOvr>
     <a:masterClrMapping/>
   </p:clrMapOvr>
+  <p:timing>
+    <p:tnLst>
+      <p:par>
+        <p:cTn id="1" dur="indefinite" restart="never" nodeType="tmRoot"/>
+      </p:par>
+    </p:tnLst>
+  </p:timing>
 </p:sld>
 </file>
 
@@ -22587,6 +22776,13 @@
   <p:clrMapOvr>
     <a:masterClrMapping/>
   </p:clrMapOvr>
+  <p:timing>
+    <p:tnLst>
+      <p:par>
+        <p:cTn id="1" dur="indefinite" restart="never" nodeType="tmRoot"/>
+      </p:par>
+    </p:tnLst>
+  </p:timing>
 </p:sld>
 </file>
 
@@ -22655,6 +22851,13 @@
   <p:clrMapOvr>
     <a:masterClrMapping/>
   </p:clrMapOvr>
+  <p:timing>
+    <p:tnLst>
+      <p:par>
+        <p:cTn id="1" dur="indefinite" restart="never" nodeType="tmRoot"/>
+      </p:par>
+    </p:tnLst>
+  </p:timing>
 </p:sld>
 </file>
 
@@ -22798,6 +23001,13 @@
   <p:clrMapOvr>
     <a:masterClrMapping/>
   </p:clrMapOvr>
+  <p:timing>
+    <p:tnLst>
+      <p:par>
+        <p:cTn id="1" dur="indefinite" restart="never" nodeType="tmRoot"/>
+      </p:par>
+    </p:tnLst>
+  </p:timing>
 </p:sld>
 </file>
 
@@ -22966,6 +23176,13 @@
   <p:clrMapOvr>
     <a:masterClrMapping/>
   </p:clrMapOvr>
+  <p:timing>
+    <p:tnLst>
+      <p:par>
+        <p:cTn id="1" dur="indefinite" restart="never" nodeType="tmRoot"/>
+      </p:par>
+    </p:tnLst>
+  </p:timing>
 </p:sld>
 </file>
 
@@ -23043,7 +23260,11 @@
             </a:r>
             <a:r>
               <a:rPr lang="en-US" dirty="0" err="1" smtClean="0"/>
-              <a:t>Object.getPrototypeOf(parent</a:t>
+              <a:t>Object.getPrototypeOf</a:t>
+            </a:r>
+            <a:r>
+              <a:rPr lang="en-US" dirty="0" err="1" smtClean="0"/>
+              <a:t>(child</a:t>
             </a:r>
             <a:r>
               <a:rPr lang="en-US" dirty="0" smtClean="0"/>
@@ -23081,6 +23302,13 @@
   <p:clrMapOvr>
     <a:masterClrMapping/>
   </p:clrMapOvr>
+  <p:timing>
+    <p:tnLst>
+      <p:par>
+        <p:cTn id="1" dur="indefinite" restart="never" nodeType="tmRoot"/>
+      </p:par>
+    </p:tnLst>
+  </p:timing>
 </p:sld>
 </file>
 
@@ -23156,6 +23384,13 @@
   <p:clrMapOvr>
     <a:masterClrMapping/>
   </p:clrMapOvr>
+  <p:timing>
+    <p:tnLst>
+      <p:par>
+        <p:cTn id="1" dur="indefinite" restart="never" nodeType="tmRoot"/>
+      </p:par>
+    </p:tnLst>
+  </p:timing>
 </p:sld>
 </file>
 
@@ -23225,11 +23460,7 @@
             <a:pPr lvl="1"/>
             <a:r>
               <a:rPr lang="en-US" dirty="0" smtClean="0"/>
-              <a:t>There are characters who have</a:t>
-            </a:r>
-            <a:r>
-              <a:rPr lang="en-US" dirty="0" smtClean="0"/>
-              <a:t> the following properties: </a:t>
+              <a:t>There are characters who have the following properties: </a:t>
             </a:r>
             <a:r>
               <a:rPr lang="en-US" b="1" dirty="0" smtClean="0"/>
@@ -23442,6 +23673,13 @@
   <p:clrMapOvr>
     <a:masterClrMapping/>
   </p:clrMapOvr>
+  <p:timing>
+    <p:tnLst>
+      <p:par>
+        <p:cTn id="1" dur="indefinite" restart="never" nodeType="tmRoot"/>
+      </p:par>
+    </p:tnLst>
+  </p:timing>
 </p:sld>
 </file>
 

</xml_diff>